<commit_message>
Fraction changed to count
</commit_message>
<xml_diff>
--- a/INVEST.pptx
+++ b/INVEST.pptx
@@ -2798,7 +2798,7 @@
           <a:p>
             <a:fld id="{2E309023-AF2B-4043-B228-F191CADC9BB1}" type="datetimeFigureOut">
               <a:rPr lang="en-IN" smtClean="0"/>
-              <a:t>19-04-2020</a:t>
+              <a:t>20-04-2020</a:t>
             </a:fld>
             <a:endParaRPr lang="en-IN"/>
           </a:p>
@@ -3197,7 +3197,7 @@
           <a:p>
             <a:fld id="{70C018FE-C8D6-4A9C-A702-41F1E0C1C452}" type="datetimeFigureOut">
               <a:rPr lang="en-IN" smtClean="0"/>
-              <a:t>19-04-2020</a:t>
+              <a:t>20-04-2020</a:t>
             </a:fld>
             <a:endParaRPr lang="en-IN"/>
           </a:p>
@@ -3367,7 +3367,7 @@
           <a:p>
             <a:fld id="{70C018FE-C8D6-4A9C-A702-41F1E0C1C452}" type="datetimeFigureOut">
               <a:rPr lang="en-IN" smtClean="0"/>
-              <a:t>19-04-2020</a:t>
+              <a:t>20-04-2020</a:t>
             </a:fld>
             <a:endParaRPr lang="en-IN"/>
           </a:p>
@@ -3547,7 +3547,7 @@
           <a:p>
             <a:fld id="{70C018FE-C8D6-4A9C-A702-41F1E0C1C452}" type="datetimeFigureOut">
               <a:rPr lang="en-IN" smtClean="0"/>
-              <a:t>19-04-2020</a:t>
+              <a:t>20-04-2020</a:t>
             </a:fld>
             <a:endParaRPr lang="en-IN"/>
           </a:p>
@@ -3979,7 +3979,7 @@
           <a:p>
             <a:fld id="{70C018FE-C8D6-4A9C-A702-41F1E0C1C452}" type="datetimeFigureOut">
               <a:rPr lang="en-IN" smtClean="0"/>
-              <a:t>19-04-2020</a:t>
+              <a:t>20-04-2020</a:t>
             </a:fld>
             <a:endParaRPr lang="en-IN"/>
           </a:p>
@@ -4211,7 +4211,7 @@
           <a:p>
             <a:fld id="{70C018FE-C8D6-4A9C-A702-41F1E0C1C452}" type="datetimeFigureOut">
               <a:rPr lang="en-IN" smtClean="0"/>
-              <a:t>19-04-2020</a:t>
+              <a:t>20-04-2020</a:t>
             </a:fld>
             <a:endParaRPr lang="en-IN"/>
           </a:p>
@@ -4578,7 +4578,7 @@
           <a:p>
             <a:fld id="{70C018FE-C8D6-4A9C-A702-41F1E0C1C452}" type="datetimeFigureOut">
               <a:rPr lang="en-IN" smtClean="0"/>
-              <a:t>19-04-2020</a:t>
+              <a:t>20-04-2020</a:t>
             </a:fld>
             <a:endParaRPr lang="en-IN"/>
           </a:p>
@@ -4696,7 +4696,7 @@
           <a:p>
             <a:fld id="{70C018FE-C8D6-4A9C-A702-41F1E0C1C452}" type="datetimeFigureOut">
               <a:rPr lang="en-IN" smtClean="0"/>
-              <a:t>19-04-2020</a:t>
+              <a:t>20-04-2020</a:t>
             </a:fld>
             <a:endParaRPr lang="en-IN"/>
           </a:p>
@@ -4791,7 +4791,7 @@
           <a:p>
             <a:fld id="{70C018FE-C8D6-4A9C-A702-41F1E0C1C452}" type="datetimeFigureOut">
               <a:rPr lang="en-IN" smtClean="0"/>
-              <a:t>19-04-2020</a:t>
+              <a:t>20-04-2020</a:t>
             </a:fld>
             <a:endParaRPr lang="en-IN"/>
           </a:p>
@@ -5067,7 +5067,7 @@
           <a:p>
             <a:fld id="{70C018FE-C8D6-4A9C-A702-41F1E0C1C452}" type="datetimeFigureOut">
               <a:rPr lang="en-IN" smtClean="0"/>
-              <a:t>19-04-2020</a:t>
+              <a:t>20-04-2020</a:t>
             </a:fld>
             <a:endParaRPr lang="en-IN"/>
           </a:p>
@@ -5324,7 +5324,7 @@
           <a:p>
             <a:fld id="{70C018FE-C8D6-4A9C-A702-41F1E0C1C452}" type="datetimeFigureOut">
               <a:rPr lang="en-IN" smtClean="0"/>
-              <a:t>19-04-2020</a:t>
+              <a:t>20-04-2020</a:t>
             </a:fld>
             <a:endParaRPr lang="en-IN"/>
           </a:p>
@@ -5535,7 +5535,7 @@
           <a:p>
             <a:fld id="{70C018FE-C8D6-4A9C-A702-41F1E0C1C452}" type="datetimeFigureOut">
               <a:rPr lang="en-IN" smtClean="0"/>
-              <a:t>19-04-2020</a:t>
+              <a:t>20-04-2020</a:t>
             </a:fld>
             <a:endParaRPr lang="en-IN" dirty="0"/>
           </a:p>
@@ -7728,7 +7728,7 @@
             <a:pPr lvl="1"/>
             <a:r>
               <a:rPr lang="en-IN" sz="2000" dirty="0"/>
-              <a:t>Fraction of total investment and the mean investment amount for the desired four funding types</a:t>
+              <a:t>Count of total investments and the mean investment amount for the desired four funding types</a:t>
             </a:r>
           </a:p>
           <a:p>
@@ -9352,10 +9352,10 @@
       </p:sp>
       <p:pic>
         <p:nvPicPr>
-          <p:cNvPr id="4" name="Picture 3">
+          <p:cNvPr id="3" name="Picture 2">
             <a:extLst>
               <a:ext uri="{FF2B5EF4-FFF2-40B4-BE49-F238E27FC236}">
-                <a16:creationId xmlns:a16="http://schemas.microsoft.com/office/drawing/2014/main" id="{26CF2434-EF17-4412-9D1F-5B7AA6993BAF}"/>
+                <a16:creationId xmlns:a16="http://schemas.microsoft.com/office/drawing/2014/main" id="{D6025953-1F65-450E-A713-B9AA18D0BD02}"/>
               </a:ext>
             </a:extLst>
           </p:cNvPr>
@@ -9372,8 +9372,8 @@
         </p:blipFill>
         <p:spPr>
           <a:xfrm>
-            <a:off x="888381" y="1441282"/>
-            <a:ext cx="9561905" cy="5247619"/>
+            <a:off x="1205524" y="1302761"/>
+            <a:ext cx="9780952" cy="5238095"/>
           </a:xfrm>
           <a:prstGeom prst="rect">
             <a:avLst/>

</xml_diff>

<commit_message>
pdf conversion and zipped
</commit_message>
<xml_diff>
--- a/INVEST.pptx
+++ b/INVEST.pptx
@@ -6561,7 +6561,7 @@
         <p:spPr>
           <a:xfrm>
             <a:off x="788938" y="3458252"/>
-            <a:ext cx="3080657" cy="432729"/>
+            <a:ext cx="3080657" cy="489496"/>
           </a:xfrm>
           <a:prstGeom prst="rect">
             <a:avLst/>
@@ -7157,8 +7157,8 @@
         </p:nvCxnSpPr>
         <p:spPr>
           <a:xfrm flipH="1">
-            <a:off x="2314162" y="3936782"/>
-            <a:ext cx="10070" cy="650259"/>
+            <a:off x="2314162" y="4003653"/>
+            <a:ext cx="13468" cy="587295"/>
           </a:xfrm>
           <a:prstGeom prst="straightConnector1">
             <a:avLst/>
@@ -9344,7 +9344,7 @@
             <a:pPr algn="ctr"/>
             <a:r>
               <a:rPr lang="en-IN" sz="3600" b="1" dirty="0"/>
-              <a:t>Plots of Fraction of Total Investment and Average investment </a:t>
+              <a:t>Plots of Count of Total Investment and Average Investment </a:t>
             </a:r>
             <a:endParaRPr lang="en-IN" sz="3600" dirty="0"/>
           </a:p>
@@ -9422,7 +9422,7 @@
         </p:nvSpPr>
         <p:spPr>
           <a:xfrm>
-            <a:off x="1136468" y="70529"/>
+            <a:off x="1232262" y="627877"/>
             <a:ext cx="9313817" cy="856138"/>
           </a:xfrm>
         </p:spPr>
@@ -9463,7 +9463,7 @@
         </p:blipFill>
         <p:spPr>
           <a:xfrm>
-            <a:off x="1514611" y="1113392"/>
+            <a:off x="1436233" y="1592363"/>
             <a:ext cx="8714286" cy="5057143"/>
           </a:xfrm>
           <a:prstGeom prst="rect">
@@ -9513,7 +9513,7 @@
         </p:nvSpPr>
         <p:spPr>
           <a:xfrm>
-            <a:off x="1182651" y="230744"/>
+            <a:off x="1226194" y="822927"/>
             <a:ext cx="9313817" cy="856138"/>
           </a:xfrm>
         </p:spPr>
@@ -9554,7 +9554,7 @@
         </p:blipFill>
         <p:spPr>
           <a:xfrm>
-            <a:off x="1841093" y="1323702"/>
+            <a:off x="1841093" y="1820415"/>
             <a:ext cx="8509814" cy="4806841"/>
           </a:xfrm>
           <a:prstGeom prst="rect">

</xml_diff>